<commit_message>
Added Visual for state brewery Count to PP and Rmd Deliverable
</commit_message>
<xml_diff>
--- a/MSDS6306_CaseStudy1_TAJAR.pptx
+++ b/MSDS6306_CaseStudy1_TAJAR.pptx
@@ -117,6 +117,11 @@
       </a:defRPr>
     </a:lvl9pPr>
   </p:defaultTextStyle>
+  <p:extLst>
+    <p:ext uri="{EFAFB233-063F-42B5-8137-9DF3F51BA10A}">
+      <p15:sldGuideLst xmlns:p15="http://schemas.microsoft.com/office/powerpoint/2012/main"/>
+    </p:ext>
+  </p:extLst>
 </p:presentation>
 </file>
 
@@ -3050,7 +3055,7 @@
             <a:fld id="{B61BEF0D-F0BB-DE4B-95CE-6DB70DBA9567}" type="datetimeFigureOut">
               <a:rPr lang="en-US" dirty="0"/>
               <a:pPr/>
-              <a:t>6/19/2018</a:t>
+              <a:t>6/23/2018</a:t>
             </a:fld>
             <a:endParaRPr lang="en-US" dirty="0"/>
           </a:p>
@@ -3338,7 +3343,7 @@
             <a:fld id="{B61BEF0D-F0BB-DE4B-95CE-6DB70DBA9567}" type="datetimeFigureOut">
               <a:rPr lang="en-US" dirty="0"/>
               <a:pPr/>
-              <a:t>6/19/2018</a:t>
+              <a:t>6/23/2018</a:t>
             </a:fld>
             <a:endParaRPr lang="en-US" dirty="0"/>
           </a:p>
@@ -3583,7 +3588,7 @@
             <a:fld id="{B61BEF0D-F0BB-DE4B-95CE-6DB70DBA9567}" type="datetimeFigureOut">
               <a:rPr lang="en-US" dirty="0"/>
               <a:pPr/>
-              <a:t>6/19/2018</a:t>
+              <a:t>6/23/2018</a:t>
             </a:fld>
             <a:endParaRPr lang="en-US" dirty="0"/>
           </a:p>
@@ -4116,7 +4121,7 @@
             <a:fld id="{B61BEF0D-F0BB-DE4B-95CE-6DB70DBA9567}" type="datetimeFigureOut">
               <a:rPr lang="en-US" dirty="0"/>
               <a:pPr/>
-              <a:t>6/19/2018</a:t>
+              <a:t>6/23/2018</a:t>
             </a:fld>
             <a:endParaRPr lang="en-US" dirty="0"/>
           </a:p>
@@ -4361,7 +4366,7 @@
             <a:fld id="{B61BEF0D-F0BB-DE4B-95CE-6DB70DBA9567}" type="datetimeFigureOut">
               <a:rPr lang="en-US" dirty="0"/>
               <a:pPr/>
-              <a:t>6/19/2018</a:t>
+              <a:t>6/23/2018</a:t>
             </a:fld>
             <a:endParaRPr lang="en-US" dirty="0"/>
           </a:p>
@@ -4901,7 +4906,7 @@
             <a:fld id="{B61BEF0D-F0BB-DE4B-95CE-6DB70DBA9567}" type="datetimeFigureOut">
               <a:rPr lang="en-US" dirty="0"/>
               <a:pPr/>
-              <a:t>6/19/2018</a:t>
+              <a:t>6/23/2018</a:t>
             </a:fld>
             <a:endParaRPr lang="en-US" dirty="0"/>
           </a:p>
@@ -5208,7 +5213,7 @@
             <a:fld id="{B61BEF0D-F0BB-DE4B-95CE-6DB70DBA9567}" type="datetimeFigureOut">
               <a:rPr lang="en-US" dirty="0"/>
               <a:pPr/>
-              <a:t>6/19/2018</a:t>
+              <a:t>6/23/2018</a:t>
             </a:fld>
             <a:endParaRPr lang="en-US" dirty="0"/>
           </a:p>
@@ -5380,7 +5385,7 @@
             <a:fld id="{B61BEF0D-F0BB-DE4B-95CE-6DB70DBA9567}" type="datetimeFigureOut">
               <a:rPr lang="en-US" dirty="0"/>
               <a:pPr/>
-              <a:t>6/19/2018</a:t>
+              <a:t>6/23/2018</a:t>
             </a:fld>
             <a:endParaRPr lang="en-US" dirty="0"/>
           </a:p>
@@ -5557,7 +5562,7 @@
             <a:fld id="{B61BEF0D-F0BB-DE4B-95CE-6DB70DBA9567}" type="datetimeFigureOut">
               <a:rPr lang="en-US" dirty="0"/>
               <a:pPr/>
-              <a:t>6/19/2018</a:t>
+              <a:t>6/23/2018</a:t>
             </a:fld>
             <a:endParaRPr lang="en-US" dirty="0"/>
           </a:p>
@@ -5724,7 +5729,7 @@
             <a:fld id="{B61BEF0D-F0BB-DE4B-95CE-6DB70DBA9567}" type="datetimeFigureOut">
               <a:rPr lang="en-US" dirty="0"/>
               <a:pPr/>
-              <a:t>6/19/2018</a:t>
+              <a:t>6/23/2018</a:t>
             </a:fld>
             <a:endParaRPr lang="en-US" dirty="0"/>
           </a:p>
@@ -5967,7 +5972,7 @@
             <a:fld id="{B61BEF0D-F0BB-DE4B-95CE-6DB70DBA9567}" type="datetimeFigureOut">
               <a:rPr lang="en-US" dirty="0"/>
               <a:pPr/>
-              <a:t>6/19/2018</a:t>
+              <a:t>6/23/2018</a:t>
             </a:fld>
             <a:endParaRPr lang="en-US" dirty="0"/>
           </a:p>
@@ -6256,7 +6261,7 @@
             <a:fld id="{B61BEF0D-F0BB-DE4B-95CE-6DB70DBA9567}" type="datetimeFigureOut">
               <a:rPr lang="en-US" dirty="0"/>
               <a:pPr/>
-              <a:t>6/19/2018</a:t>
+              <a:t>6/23/2018</a:t>
             </a:fld>
             <a:endParaRPr lang="en-US" dirty="0"/>
           </a:p>
@@ -6683,7 +6688,7 @@
             <a:fld id="{B61BEF0D-F0BB-DE4B-95CE-6DB70DBA9567}" type="datetimeFigureOut">
               <a:rPr lang="en-US" dirty="0"/>
               <a:pPr/>
-              <a:t>6/19/2018</a:t>
+              <a:t>6/23/2018</a:t>
             </a:fld>
             <a:endParaRPr lang="en-US" dirty="0"/>
           </a:p>
@@ -6803,7 +6808,7 @@
             <a:fld id="{B61BEF0D-F0BB-DE4B-95CE-6DB70DBA9567}" type="datetimeFigureOut">
               <a:rPr lang="en-US" dirty="0"/>
               <a:pPr/>
-              <a:t>6/19/2018</a:t>
+              <a:t>6/23/2018</a:t>
             </a:fld>
             <a:endParaRPr lang="en-US" dirty="0"/>
           </a:p>
@@ -6895,7 +6900,7 @@
             <a:fld id="{B61BEF0D-F0BB-DE4B-95CE-6DB70DBA9567}" type="datetimeFigureOut">
               <a:rPr lang="en-US" dirty="0"/>
               <a:pPr/>
-              <a:t>6/19/2018</a:t>
+              <a:t>6/23/2018</a:t>
             </a:fld>
             <a:endParaRPr lang="en-US" dirty="0"/>
           </a:p>
@@ -7175,7 +7180,7 @@
             <a:fld id="{B61BEF0D-F0BB-DE4B-95CE-6DB70DBA9567}" type="datetimeFigureOut">
               <a:rPr lang="en-US" dirty="0"/>
               <a:pPr/>
-              <a:t>6/19/2018</a:t>
+              <a:t>6/23/2018</a:t>
             </a:fld>
             <a:endParaRPr lang="en-US" dirty="0"/>
           </a:p>
@@ -7463,7 +7468,7 @@
             <a:fld id="{B61BEF0D-F0BB-DE4B-95CE-6DB70DBA9567}" type="datetimeFigureOut">
               <a:rPr lang="en-US" dirty="0"/>
               <a:pPr/>
-              <a:t>6/19/2018</a:t>
+              <a:t>6/23/2018</a:t>
             </a:fld>
             <a:endParaRPr lang="en-US" dirty="0"/>
           </a:p>
@@ -7691,7 +7696,7 @@
             <a:fld id="{B61BEF0D-F0BB-DE4B-95CE-6DB70DBA9567}" type="datetimeFigureOut">
               <a:rPr lang="en-US" dirty="0"/>
               <a:pPr/>
-              <a:t>6/19/2018</a:t>
+              <a:t>6/23/2018</a:t>
             </a:fld>
             <a:endParaRPr lang="en-US" dirty="0"/>
           </a:p>
@@ -10633,7 +10638,7 @@
         </p:blipFill>
         <p:spPr>
           <a:xfrm>
-            <a:off x="20" y="10"/>
+            <a:off x="-1578" y="10"/>
             <a:ext cx="12191980" cy="6857990"/>
           </a:xfrm>
           <a:prstGeom prst="rect">
@@ -10659,8 +10664,8 @@
         </p:nvSpPr>
         <p:spPr>
           <a:xfrm>
-            <a:off x="1141413" y="609600"/>
-            <a:ext cx="9905998" cy="1905000"/>
+            <a:off x="237173" y="271175"/>
+            <a:ext cx="9905998" cy="1056640"/>
           </a:xfrm>
         </p:spPr>
         <p:txBody>
@@ -10676,41 +10681,38 @@
           </a:p>
         </p:txBody>
       </p:sp>
-      <p:sp>
-        <p:nvSpPr>
-          <p:cNvPr id="11" name="Content Placeholder 10">
+      <p:pic>
+        <p:nvPicPr>
+          <p:cNvPr id="3" name="Content Placeholder 2">
             <a:extLst>
               <a:ext uri="{FF2B5EF4-FFF2-40B4-BE49-F238E27FC236}">
-                <a16:creationId xmlns:a16="http://schemas.microsoft.com/office/drawing/2014/main" id="{49B9B5E6-9400-45A5-A2C0-33B69C7EF838}"/>
+                <a16:creationId xmlns:a16="http://schemas.microsoft.com/office/drawing/2014/main" id="{5F9C24FD-F0BE-41B9-90CB-49C6C2C83E02}"/>
               </a:ext>
             </a:extLst>
           </p:cNvPr>
-          <p:cNvSpPr>
-            <a:spLocks noGrp="1"/>
-          </p:cNvSpPr>
+          <p:cNvPicPr>
+            <a:picLocks noGrp="1" noChangeAspect="1"/>
+          </p:cNvPicPr>
           <p:nvPr>
             <p:ph idx="1"/>
           </p:nvPr>
-        </p:nvSpPr>
+        </p:nvPicPr>
+        <p:blipFill>
+          <a:blip r:embed="rId5"/>
+          <a:stretch>
+            <a:fillRect/>
+          </a:stretch>
+        </p:blipFill>
         <p:spPr>
           <a:xfrm>
-            <a:off x="1141413" y="2666999"/>
-            <a:ext cx="9905998" cy="3124201"/>
+            <a:off x="98586" y="1060149"/>
+            <a:ext cx="11442440" cy="5641944"/>
           </a:xfrm>
+          <a:prstGeom prst="rect">
+            <a:avLst/>
+          </a:prstGeom>
         </p:spPr>
-        <p:txBody>
-          <a:bodyPr>
-            <a:normAutofit/>
-          </a:bodyPr>
-          <a:lstStyle/>
-          <a:p>
-            <a:r>
-              <a:rPr lang="en-US" dirty="0"/>
-              <a:t>Insert data/graphic for question 1.   How many breweries ae present in each state?</a:t>
-            </a:r>
-          </a:p>
-        </p:txBody>
-      </p:sp>
+      </p:pic>
       <p:sp>
         <p:nvSpPr>
           <p:cNvPr id="6" name="TextBox 5">
@@ -10774,7 +10776,7 @@
                 <a:solidFill>
                   <a:srgbClr val="FFFFFF"/>
                 </a:solidFill>
-                <a:hlinkClick r:id="rId5" tooltip="https://creativecommons.org/licenses/by-sa/3.0/">
+                <a:hlinkClick r:id="rId6" tooltip="https://creativecommons.org/licenses/by-sa/3.0/">
                   <a:extLst>
                     <a:ext uri="{A12FA001-AC4F-418D-AE19-62706E023703}">
                       <ahyp:hlinkClr xmlns:ahyp="http://schemas.microsoft.com/office/drawing/2018/hyperlinkcolor" val="tx"/>
@@ -10792,6 +10794,35 @@
           </a:p>
         </p:txBody>
       </p:sp>
+      <p:pic>
+        <p:nvPicPr>
+          <p:cNvPr id="4" name="Picture 3">
+            <a:extLst>
+              <a:ext uri="{FF2B5EF4-FFF2-40B4-BE49-F238E27FC236}">
+                <a16:creationId xmlns:a16="http://schemas.microsoft.com/office/drawing/2014/main" id="{71B6A99A-33E2-41C0-9B8A-9380D46F8B63}"/>
+              </a:ext>
+            </a:extLst>
+          </p:cNvPr>
+          <p:cNvPicPr>
+            <a:picLocks noChangeAspect="1"/>
+          </p:cNvPicPr>
+          <p:nvPr/>
+        </p:nvPicPr>
+        <p:blipFill rotWithShape="1">
+          <a:blip r:embed="rId7"/>
+          <a:srcRect l="4962" r="7310"/>
+          <a:stretch/>
+        </p:blipFill>
+        <p:spPr>
+          <a:xfrm>
+            <a:off x="11048725" y="83653"/>
+            <a:ext cx="1044689" cy="5947870"/>
+          </a:xfrm>
+          <a:prstGeom prst="rect">
+            <a:avLst/>
+          </a:prstGeom>
+        </p:spPr>
+      </p:pic>
     </p:spTree>
     <p:extLst>
       <p:ext uri="{BB962C8B-B14F-4D97-AF65-F5344CB8AC3E}">
@@ -10802,6 +10833,124 @@
   <p:clrMapOvr>
     <a:masterClrMapping/>
   </p:clrMapOvr>
+  <p:timing>
+    <p:tnLst>
+      <p:par>
+        <p:cTn id="1" dur="indefinite" restart="never" nodeType="tmRoot">
+          <p:childTnLst>
+            <p:seq concurrent="1" nextAc="seek">
+              <p:cTn id="2" dur="indefinite" nodeType="mainSeq">
+                <p:childTnLst>
+                  <p:par>
+                    <p:cTn id="3" fill="hold">
+                      <p:stCondLst>
+                        <p:cond delay="indefinite"/>
+                      </p:stCondLst>
+                      <p:childTnLst>
+                        <p:par>
+                          <p:cTn id="4" fill="hold">
+                            <p:stCondLst>
+                              <p:cond delay="0"/>
+                            </p:stCondLst>
+                            <p:childTnLst>
+                              <p:par>
+                                <p:cTn id="5" presetID="6" presetClass="entr" presetSubtype="16" fill="hold" nodeType="clickEffect">
+                                  <p:stCondLst>
+                                    <p:cond delay="0"/>
+                                  </p:stCondLst>
+                                  <p:childTnLst>
+                                    <p:set>
+                                      <p:cBhvr>
+                                        <p:cTn id="6" dur="1" fill="hold">
+                                          <p:stCondLst>
+                                            <p:cond delay="0"/>
+                                          </p:stCondLst>
+                                        </p:cTn>
+                                        <p:tgtEl>
+                                          <p:spTgt spid="3"/>
+                                        </p:tgtEl>
+                                        <p:attrNameLst>
+                                          <p:attrName>style.visibility</p:attrName>
+                                        </p:attrNameLst>
+                                      </p:cBhvr>
+                                      <p:to>
+                                        <p:strVal val="visible"/>
+                                      </p:to>
+                                    </p:set>
+                                    <p:animEffect transition="in" filter="circle(in)">
+                                      <p:cBhvr>
+                                        <p:cTn id="7" dur="2000"/>
+                                        <p:tgtEl>
+                                          <p:spTgt spid="3"/>
+                                        </p:tgtEl>
+                                      </p:cBhvr>
+                                    </p:animEffect>
+                                  </p:childTnLst>
+                                </p:cTn>
+                              </p:par>
+                              <p:par>
+                                <p:cTn id="8" presetID="6" presetClass="entr" presetSubtype="16" fill="hold" nodeType="withEffect">
+                                  <p:stCondLst>
+                                    <p:cond delay="0"/>
+                                  </p:stCondLst>
+                                  <p:childTnLst>
+                                    <p:set>
+                                      <p:cBhvr>
+                                        <p:cTn id="9" dur="1" fill="hold">
+                                          <p:stCondLst>
+                                            <p:cond delay="0"/>
+                                          </p:stCondLst>
+                                        </p:cTn>
+                                        <p:tgtEl>
+                                          <p:spTgt spid="4"/>
+                                        </p:tgtEl>
+                                        <p:attrNameLst>
+                                          <p:attrName>style.visibility</p:attrName>
+                                        </p:attrNameLst>
+                                      </p:cBhvr>
+                                      <p:to>
+                                        <p:strVal val="visible"/>
+                                      </p:to>
+                                    </p:set>
+                                    <p:animEffect transition="in" filter="circle(in)">
+                                      <p:cBhvr>
+                                        <p:cTn id="10" dur="2000"/>
+                                        <p:tgtEl>
+                                          <p:spTgt spid="4"/>
+                                        </p:tgtEl>
+                                      </p:cBhvr>
+                                    </p:animEffect>
+                                  </p:childTnLst>
+                                </p:cTn>
+                              </p:par>
+                            </p:childTnLst>
+                          </p:cTn>
+                        </p:par>
+                      </p:childTnLst>
+                    </p:cTn>
+                  </p:par>
+                </p:childTnLst>
+              </p:cTn>
+              <p:prevCondLst>
+                <p:cond evt="onPrev" delay="0">
+                  <p:tgtEl>
+                    <p:sldTgt/>
+                  </p:tgtEl>
+                </p:cond>
+              </p:prevCondLst>
+              <p:nextCondLst>
+                <p:cond evt="onNext" delay="0">
+                  <p:tgtEl>
+                    <p:sldTgt/>
+                  </p:tgtEl>
+                </p:cond>
+              </p:nextCondLst>
+            </p:seq>
+          </p:childTnLst>
+        </p:cTn>
+      </p:par>
+    </p:tnLst>
+  </p:timing>
 </p:sld>
 </file>
 

</xml_diff>